<commit_message>
Oprava termínu školení v leafletu.
</commit_message>
<xml_diff>
--- a/flyers/skoleni-qgis-zakladni.pptx
+++ b/flyers/skoleni-qgis-zakladni.pptx
@@ -3279,7 +3279,29 @@
                   </a:schemeClr>
                 </a:solidFill>
               </a:rPr>
-              <a:t>  3-4. října 2014</a:t>
+              <a:t>  3-4. </a:t>
+            </a:r>
+            <a:r>
+              <a:rPr lang="cs-CZ" sz="1100" dirty="0" smtClean="0">
+                <a:solidFill>
+                  <a:schemeClr val="tx1">
+                    <a:lumMod val="50000"/>
+                    <a:lumOff val="50000"/>
+                  </a:schemeClr>
+                </a:solidFill>
+              </a:rPr>
+              <a:t>listopadu </a:t>
+            </a:r>
+            <a:r>
+              <a:rPr lang="cs-CZ" sz="1100" dirty="0" smtClean="0">
+                <a:solidFill>
+                  <a:schemeClr val="tx1">
+                    <a:lumMod val="50000"/>
+                    <a:lumOff val="50000"/>
+                  </a:schemeClr>
+                </a:solidFill>
+              </a:rPr>
+              <a:t>2014</a:t>
             </a:r>
           </a:p>
           <a:p>

</xml_diff>

<commit_message>
remove data from qgis fliers
</commit_message>
<xml_diff>
--- a/flyers/skoleni-qgis-zakladni.pptx
+++ b/flyers/skoleni-qgis-zakladni.pptx
@@ -289,7 +289,7 @@
             <a:fld id="{18A2481B-5154-415F-B752-558547769AA3}" type="datetimeFigureOut">
               <a:rPr lang="cs-CZ" smtClean="0"/>
               <a:pPr/>
-              <a:t>4. 9. 2014</a:t>
+              <a:t>28.1.2015</a:t>
             </a:fld>
             <a:endParaRPr lang="cs-CZ"/>
           </a:p>
@@ -456,7 +456,7 @@
             <a:fld id="{18A2481B-5154-415F-B752-558547769AA3}" type="datetimeFigureOut">
               <a:rPr lang="cs-CZ" smtClean="0"/>
               <a:pPr/>
-              <a:t>4. 9. 2014</a:t>
+              <a:t>28.1.2015</a:t>
             </a:fld>
             <a:endParaRPr lang="cs-CZ"/>
           </a:p>
@@ -633,7 +633,7 @@
             <a:fld id="{18A2481B-5154-415F-B752-558547769AA3}" type="datetimeFigureOut">
               <a:rPr lang="cs-CZ" smtClean="0"/>
               <a:pPr/>
-              <a:t>4. 9. 2014</a:t>
+              <a:t>28.1.2015</a:t>
             </a:fld>
             <a:endParaRPr lang="cs-CZ"/>
           </a:p>
@@ -800,7 +800,7 @@
             <a:fld id="{18A2481B-5154-415F-B752-558547769AA3}" type="datetimeFigureOut">
               <a:rPr lang="cs-CZ" smtClean="0"/>
               <a:pPr/>
-              <a:t>4. 9. 2014</a:t>
+              <a:t>28.1.2015</a:t>
             </a:fld>
             <a:endParaRPr lang="cs-CZ"/>
           </a:p>
@@ -1043,7 +1043,7 @@
             <a:fld id="{18A2481B-5154-415F-B752-558547769AA3}" type="datetimeFigureOut">
               <a:rPr lang="cs-CZ" smtClean="0"/>
               <a:pPr/>
-              <a:t>4. 9. 2014</a:t>
+              <a:t>28.1.2015</a:t>
             </a:fld>
             <a:endParaRPr lang="cs-CZ"/>
           </a:p>
@@ -1328,7 +1328,7 @@
             <a:fld id="{18A2481B-5154-415F-B752-558547769AA3}" type="datetimeFigureOut">
               <a:rPr lang="cs-CZ" smtClean="0"/>
               <a:pPr/>
-              <a:t>4. 9. 2014</a:t>
+              <a:t>28.1.2015</a:t>
             </a:fld>
             <a:endParaRPr lang="cs-CZ"/>
           </a:p>
@@ -1747,7 +1747,7 @@
             <a:fld id="{18A2481B-5154-415F-B752-558547769AA3}" type="datetimeFigureOut">
               <a:rPr lang="cs-CZ" smtClean="0"/>
               <a:pPr/>
-              <a:t>4. 9. 2014</a:t>
+              <a:t>28.1.2015</a:t>
             </a:fld>
             <a:endParaRPr lang="cs-CZ"/>
           </a:p>
@@ -1862,7 +1862,7 @@
             <a:fld id="{18A2481B-5154-415F-B752-558547769AA3}" type="datetimeFigureOut">
               <a:rPr lang="cs-CZ" smtClean="0"/>
               <a:pPr/>
-              <a:t>4. 9. 2014</a:t>
+              <a:t>28.1.2015</a:t>
             </a:fld>
             <a:endParaRPr lang="cs-CZ"/>
           </a:p>
@@ -1954,7 +1954,7 @@
             <a:fld id="{18A2481B-5154-415F-B752-558547769AA3}" type="datetimeFigureOut">
               <a:rPr lang="cs-CZ" smtClean="0"/>
               <a:pPr/>
-              <a:t>4. 9. 2014</a:t>
+              <a:t>28.1.2015</a:t>
             </a:fld>
             <a:endParaRPr lang="cs-CZ"/>
           </a:p>
@@ -2228,7 +2228,7 @@
             <a:fld id="{18A2481B-5154-415F-B752-558547769AA3}" type="datetimeFigureOut">
               <a:rPr lang="cs-CZ" smtClean="0"/>
               <a:pPr/>
-              <a:t>4. 9. 2014</a:t>
+              <a:t>28.1.2015</a:t>
             </a:fld>
             <a:endParaRPr lang="cs-CZ"/>
           </a:p>
@@ -2478,7 +2478,7 @@
             <a:fld id="{18A2481B-5154-415F-B752-558547769AA3}" type="datetimeFigureOut">
               <a:rPr lang="cs-CZ" smtClean="0"/>
               <a:pPr/>
-              <a:t>4. 9. 2014</a:t>
+              <a:t>28.1.2015</a:t>
             </a:fld>
             <a:endParaRPr lang="cs-CZ"/>
           </a:p>
@@ -2688,7 +2688,7 @@
             <a:fld id="{18A2481B-5154-415F-B752-558547769AA3}" type="datetimeFigureOut">
               <a:rPr lang="cs-CZ" smtClean="0"/>
               <a:pPr/>
-              <a:t>4. 9. 2014</a:t>
+              <a:t>28.1.2015</a:t>
             </a:fld>
             <a:endParaRPr lang="cs-CZ"/>
           </a:p>
@@ -3228,8 +3228,8 @@
         </p:nvSpPr>
         <p:spPr>
           <a:xfrm>
-            <a:off x="35496" y="5013176"/>
-            <a:ext cx="4248472" cy="1584176"/>
+            <a:off x="35496" y="5229200"/>
+            <a:ext cx="4248472" cy="1368152"/>
           </a:xfrm>
           <a:prstGeom prst="rect">
             <a:avLst/>
@@ -3268,7 +3268,29 @@
                   </a:schemeClr>
                 </a:solidFill>
               </a:rPr>
-              <a:t>Kdy:</a:t>
+              <a:t>Kdy</a:t>
+            </a:r>
+            <a:r>
+              <a:rPr lang="cs-CZ" sz="1100" b="1" dirty="0" smtClean="0">
+                <a:solidFill>
+                  <a:schemeClr val="tx1">
+                    <a:lumMod val="50000"/>
+                    <a:lumOff val="50000"/>
+                  </a:schemeClr>
+                </a:solidFill>
+              </a:rPr>
+              <a:t>: </a:t>
+            </a:r>
+            <a:r>
+              <a:rPr lang="en-US" sz="1100" b="1" dirty="0" smtClean="0">
+                <a:solidFill>
+                  <a:schemeClr val="tx1">
+                    <a:lumMod val="50000"/>
+                    <a:lumOff val="50000"/>
+                  </a:schemeClr>
+                </a:solidFill>
+              </a:rPr>
+              <a:t>  </a:t>
             </a:r>
             <a:r>
               <a:rPr lang="cs-CZ" sz="1100" dirty="0" smtClean="0">
@@ -3279,20 +3301,51 @@
                   </a:schemeClr>
                 </a:solidFill>
               </a:rPr>
-              <a:t>  18-19. listopadu 2014</a:t>
-            </a:r>
-          </a:p>
-          <a:p>
-            <a:r>
-              <a:rPr lang="cs-CZ" sz="1100" b="1" dirty="0" smtClean="0">
-                <a:solidFill>
-                  <a:schemeClr val="tx1">
-                    <a:lumMod val="50000"/>
-                    <a:lumOff val="50000"/>
-                  </a:schemeClr>
-                </a:solidFill>
-              </a:rPr>
-              <a:t>Kde: </a:t>
+              <a:t>jaro </a:t>
+            </a:r>
+            <a:r>
+              <a:rPr lang="en-US" sz="1100" dirty="0" smtClean="0">
+                <a:solidFill>
+                  <a:schemeClr val="tx1">
+                    <a:lumMod val="50000"/>
+                    <a:lumOff val="50000"/>
+                  </a:schemeClr>
+                </a:solidFill>
+              </a:rPr>
+              <a:t>2015 (</a:t>
+            </a:r>
+            <a:r>
+              <a:rPr lang="en-US" sz="1100" dirty="0" err="1" smtClean="0">
+                <a:solidFill>
+                  <a:schemeClr val="tx1">
+                    <a:lumMod val="50000"/>
+                    <a:lumOff val="50000"/>
+                  </a:schemeClr>
+                </a:solidFill>
+              </a:rPr>
+              <a:t>bude</a:t>
+            </a:r>
+            <a:r>
+              <a:rPr lang="en-US" sz="1100" dirty="0" smtClean="0">
+                <a:solidFill>
+                  <a:schemeClr val="tx1">
+                    <a:lumMod val="50000"/>
+                    <a:lumOff val="50000"/>
+                  </a:schemeClr>
+                </a:solidFill>
+              </a:rPr>
+              <a:t> up</a:t>
+            </a:r>
+            <a:r>
+              <a:rPr lang="cs-CZ" sz="1100" dirty="0" err="1" smtClean="0">
+                <a:solidFill>
+                  <a:schemeClr val="tx1">
+                    <a:lumMod val="50000"/>
+                    <a:lumOff val="50000"/>
+                  </a:schemeClr>
+                </a:solidFill>
+              </a:rPr>
+              <a:t>řesněnío</a:t>
             </a:r>
             <a:r>
               <a:rPr lang="cs-CZ" sz="1100" dirty="0" smtClean="0">
@@ -3303,19 +3356,7 @@
                   </a:schemeClr>
                 </a:solidFill>
               </a:rPr>
-              <a:t>  </a:t>
-            </a:r>
-            <a:r>
-              <a:rPr lang="cs-CZ" sz="1100" dirty="0" smtClean="0">
-                <a:solidFill>
-                  <a:schemeClr val="tx1">
-                    <a:lumMod val="50000"/>
-                    <a:lumOff val="50000"/>
-                  </a:schemeClr>
-                </a:solidFill>
-                <a:hlinkClick r:id="rId3"/>
-              </a:rPr>
-              <a:t>www.edu2000.cz</a:t>
+              <a:t>)</a:t>
             </a:r>
             <a:endParaRPr lang="cs-CZ" sz="1100" dirty="0" smtClean="0">
               <a:solidFill>
@@ -3328,6 +3369,17 @@
           </a:p>
           <a:p>
             <a:r>
+              <a:rPr lang="cs-CZ" sz="1100" b="1" dirty="0" smtClean="0">
+                <a:solidFill>
+                  <a:schemeClr val="tx1">
+                    <a:lumMod val="50000"/>
+                    <a:lumOff val="50000"/>
+                  </a:schemeClr>
+                </a:solidFill>
+              </a:rPr>
+              <a:t>Kde: </a:t>
+            </a:r>
+            <a:r>
               <a:rPr lang="cs-CZ" sz="1100" dirty="0" smtClean="0">
                 <a:solidFill>
                   <a:schemeClr val="tx1">
@@ -3336,6 +3388,39 @@
                   </a:schemeClr>
                 </a:solidFill>
               </a:rPr>
+              <a:t>  </a:t>
+            </a:r>
+            <a:r>
+              <a:rPr lang="cs-CZ" sz="1100" dirty="0" smtClean="0">
+                <a:solidFill>
+                  <a:schemeClr val="tx1">
+                    <a:lumMod val="50000"/>
+                    <a:lumOff val="50000"/>
+                  </a:schemeClr>
+                </a:solidFill>
+                <a:hlinkClick r:id="rId3"/>
+              </a:rPr>
+              <a:t>www.edu2000.cz</a:t>
+            </a:r>
+            <a:endParaRPr lang="cs-CZ" sz="1100" dirty="0" smtClean="0">
+              <a:solidFill>
+                <a:schemeClr val="tx1">
+                  <a:lumMod val="50000"/>
+                  <a:lumOff val="50000"/>
+                </a:schemeClr>
+              </a:solidFill>
+            </a:endParaRPr>
+          </a:p>
+          <a:p>
+            <a:r>
+              <a:rPr lang="cs-CZ" sz="1100" dirty="0" smtClean="0">
+                <a:solidFill>
+                  <a:schemeClr val="tx1">
+                    <a:lumMod val="50000"/>
+                    <a:lumOff val="50000"/>
+                  </a:schemeClr>
+                </a:solidFill>
+              </a:rPr>
               <a:t>           Oldřichova 49, Praha 2</a:t>
             </a:r>
           </a:p>
@@ -3362,7 +3447,18 @@
                   </a:schemeClr>
                 </a:solidFill>
               </a:rPr>
-              <a:t>           50°04’N, 14°25’E</a:t>
+              <a:t>           50°04’N, </a:t>
+            </a:r>
+            <a:r>
+              <a:rPr lang="cs-CZ" sz="1100" dirty="0" smtClean="0">
+                <a:solidFill>
+                  <a:schemeClr val="tx1">
+                    <a:lumMod val="50000"/>
+                    <a:lumOff val="50000"/>
+                  </a:schemeClr>
+                </a:solidFill>
+              </a:rPr>
+              <a:t>14°25’E</a:t>
             </a:r>
           </a:p>
           <a:p>
@@ -3375,7 +3471,18 @@
                   </a:schemeClr>
                 </a:solidFill>
               </a:rPr>
-              <a:t>Cena:</a:t>
+              <a:t>Cena</a:t>
+            </a:r>
+            <a:r>
+              <a:rPr lang="cs-CZ" sz="1100" b="1" dirty="0" smtClean="0">
+                <a:solidFill>
+                  <a:schemeClr val="tx1">
+                    <a:lumMod val="50000"/>
+                    <a:lumOff val="50000"/>
+                  </a:schemeClr>
+                </a:solidFill>
+              </a:rPr>
+              <a:t>:</a:t>
             </a:r>
             <a:r>
               <a:rPr lang="cs-CZ" sz="1100" dirty="0" smtClean="0">
@@ -3397,7 +3504,40 @@
                   </a:schemeClr>
                 </a:solidFill>
               </a:rPr>
-              <a:t>při registraci do 30.9., maximálně 5 míst </a:t>
+              <a:t>při </a:t>
+            </a:r>
+            <a:r>
+              <a:rPr lang="en-US" sz="900" dirty="0" smtClean="0">
+                <a:solidFill>
+                  <a:schemeClr val="tx1">
+                    <a:lumMod val="50000"/>
+                    <a:lumOff val="50000"/>
+                  </a:schemeClr>
+                </a:solidFill>
+              </a:rPr>
+              <a:t>v</a:t>
+            </a:r>
+            <a:r>
+              <a:rPr lang="cs-CZ" sz="900" dirty="0" smtClean="0">
+                <a:solidFill>
+                  <a:schemeClr val="tx1">
+                    <a:lumMod val="50000"/>
+                    <a:lumOff val="50000"/>
+                  </a:schemeClr>
+                </a:solidFill>
+              </a:rPr>
+              <a:t>časné registraci </a:t>
+            </a:r>
+            <a:r>
+              <a:rPr lang="cs-CZ" sz="900" dirty="0" smtClean="0">
+                <a:solidFill>
+                  <a:schemeClr val="tx1">
+                    <a:lumMod val="50000"/>
+                    <a:lumOff val="50000"/>
+                  </a:schemeClr>
+                </a:solidFill>
+              </a:rPr>
+              <a:t>maximálně 5 míst </a:t>
             </a:r>
           </a:p>
           <a:p>
@@ -3410,8 +3550,27 @@
                   </a:schemeClr>
                 </a:solidFill>
               </a:rPr>
-              <a:t>            6000,- Kč včasná registrace do 30.9.</a:t>
-            </a:r>
+              <a:t>            6000,- Kč včasná </a:t>
+            </a:r>
+            <a:r>
+              <a:rPr lang="cs-CZ" sz="1100" dirty="0" smtClean="0">
+                <a:solidFill>
+                  <a:schemeClr val="tx1">
+                    <a:lumMod val="50000"/>
+                    <a:lumOff val="50000"/>
+                  </a:schemeClr>
+                </a:solidFill>
+              </a:rPr>
+              <a:t>registrace</a:t>
+            </a:r>
+            <a:endParaRPr lang="cs-CZ" sz="1100" dirty="0" smtClean="0">
+              <a:solidFill>
+                <a:schemeClr val="tx1">
+                  <a:lumMod val="50000"/>
+                  <a:lumOff val="50000"/>
+                </a:schemeClr>
+              </a:solidFill>
+            </a:endParaRPr>
           </a:p>
           <a:p>
             <a:r>

</xml_diff>

<commit_message>
fix typo in qgis flyier
</commit_message>
<xml_diff>
--- a/flyers/skoleni-qgis-zakladni.pptx
+++ b/flyers/skoleni-qgis-zakladni.pptx
@@ -3268,8 +3268,87 @@
                   </a:schemeClr>
                 </a:solidFill>
               </a:rPr>
-              <a:t>Kdy</a:t>
-            </a:r>
+              <a:t>Kdy: </a:t>
+            </a:r>
+            <a:r>
+              <a:rPr lang="en-US" sz="1100" b="1" dirty="0" smtClean="0">
+                <a:solidFill>
+                  <a:schemeClr val="tx1">
+                    <a:lumMod val="50000"/>
+                    <a:lumOff val="50000"/>
+                  </a:schemeClr>
+                </a:solidFill>
+              </a:rPr>
+              <a:t>  </a:t>
+            </a:r>
+            <a:r>
+              <a:rPr lang="cs-CZ" sz="1100" dirty="0" smtClean="0">
+                <a:solidFill>
+                  <a:schemeClr val="tx1">
+                    <a:lumMod val="50000"/>
+                    <a:lumOff val="50000"/>
+                  </a:schemeClr>
+                </a:solidFill>
+              </a:rPr>
+              <a:t>jaro </a:t>
+            </a:r>
+            <a:r>
+              <a:rPr lang="en-US" sz="1100" dirty="0" smtClean="0">
+                <a:solidFill>
+                  <a:schemeClr val="tx1">
+                    <a:lumMod val="50000"/>
+                    <a:lumOff val="50000"/>
+                  </a:schemeClr>
+                </a:solidFill>
+              </a:rPr>
+              <a:t>2015 (</a:t>
+            </a:r>
+            <a:r>
+              <a:rPr lang="en-US" sz="1100" dirty="0" err="1" smtClean="0">
+                <a:solidFill>
+                  <a:schemeClr val="tx1">
+                    <a:lumMod val="50000"/>
+                    <a:lumOff val="50000"/>
+                  </a:schemeClr>
+                </a:solidFill>
+              </a:rPr>
+              <a:t>bude</a:t>
+            </a:r>
+            <a:r>
+              <a:rPr lang="en-US" sz="1100" dirty="0" smtClean="0">
+                <a:solidFill>
+                  <a:schemeClr val="tx1">
+                    <a:lumMod val="50000"/>
+                    <a:lumOff val="50000"/>
+                  </a:schemeClr>
+                </a:solidFill>
+              </a:rPr>
+              <a:t> up</a:t>
+            </a:r>
+            <a:r>
+              <a:rPr lang="cs-CZ" sz="1100" smtClean="0">
+                <a:solidFill>
+                  <a:schemeClr val="tx1">
+                    <a:lumMod val="50000"/>
+                    <a:lumOff val="50000"/>
+                  </a:schemeClr>
+                </a:solidFill>
+              </a:rPr>
+              <a:t>řesněno</a:t>
+            </a:r>
+            <a:r>
+              <a:rPr lang="cs-CZ" sz="1100" dirty="0" smtClean="0">
+                <a:solidFill>
+                  <a:schemeClr val="tx1">
+                    <a:lumMod val="50000"/>
+                    <a:lumOff val="50000"/>
+                  </a:schemeClr>
+                </a:solidFill>
+              </a:rPr>
+              <a:t>)</a:t>
+            </a:r>
+          </a:p>
+          <a:p>
             <a:r>
               <a:rPr lang="cs-CZ" sz="1100" b="1" dirty="0" smtClean="0">
                 <a:solidFill>
@@ -3279,10 +3358,10 @@
                   </a:schemeClr>
                 </a:solidFill>
               </a:rPr>
-              <a:t>: </a:t>
-            </a:r>
-            <a:r>
-              <a:rPr lang="en-US" sz="1100" b="1" dirty="0" smtClean="0">
+              <a:t>Kde: </a:t>
+            </a:r>
+            <a:r>
+              <a:rPr lang="cs-CZ" sz="1100" dirty="0" smtClean="0">
                 <a:solidFill>
                   <a:schemeClr val="tx1">
                     <a:lumMod val="50000"/>
@@ -3300,63 +3379,9 @@
                     <a:lumOff val="50000"/>
                   </a:schemeClr>
                 </a:solidFill>
-              </a:rPr>
-              <a:t>jaro </a:t>
-            </a:r>
-            <a:r>
-              <a:rPr lang="en-US" sz="1100" dirty="0" smtClean="0">
-                <a:solidFill>
-                  <a:schemeClr val="tx1">
-                    <a:lumMod val="50000"/>
-                    <a:lumOff val="50000"/>
-                  </a:schemeClr>
-                </a:solidFill>
-              </a:rPr>
-              <a:t>2015 (</a:t>
-            </a:r>
-            <a:r>
-              <a:rPr lang="en-US" sz="1100" dirty="0" err="1" smtClean="0">
-                <a:solidFill>
-                  <a:schemeClr val="tx1">
-                    <a:lumMod val="50000"/>
-                    <a:lumOff val="50000"/>
-                  </a:schemeClr>
-                </a:solidFill>
-              </a:rPr>
-              <a:t>bude</a:t>
-            </a:r>
-            <a:r>
-              <a:rPr lang="en-US" sz="1100" dirty="0" smtClean="0">
-                <a:solidFill>
-                  <a:schemeClr val="tx1">
-                    <a:lumMod val="50000"/>
-                    <a:lumOff val="50000"/>
-                  </a:schemeClr>
-                </a:solidFill>
-              </a:rPr>
-              <a:t> up</a:t>
-            </a:r>
-            <a:r>
-              <a:rPr lang="cs-CZ" sz="1100" dirty="0" err="1" smtClean="0">
-                <a:solidFill>
-                  <a:schemeClr val="tx1">
-                    <a:lumMod val="50000"/>
-                    <a:lumOff val="50000"/>
-                  </a:schemeClr>
-                </a:solidFill>
-              </a:rPr>
-              <a:t>řesněnío</a:t>
-            </a:r>
-            <a:r>
-              <a:rPr lang="cs-CZ" sz="1100" dirty="0" smtClean="0">
-                <a:solidFill>
-                  <a:schemeClr val="tx1">
-                    <a:lumMod val="50000"/>
-                    <a:lumOff val="50000"/>
-                  </a:schemeClr>
-                </a:solidFill>
-              </a:rPr>
-              <a:t>)</a:t>
+                <a:hlinkClick r:id="rId3"/>
+              </a:rPr>
+              <a:t>www.edu2000.cz</a:t>
             </a:r>
             <a:endParaRPr lang="cs-CZ" sz="1100" dirty="0" smtClean="0">
               <a:solidFill>
@@ -3369,6 +3394,45 @@
           </a:p>
           <a:p>
             <a:r>
+              <a:rPr lang="cs-CZ" sz="1100" dirty="0" smtClean="0">
+                <a:solidFill>
+                  <a:schemeClr val="tx1">
+                    <a:lumMod val="50000"/>
+                    <a:lumOff val="50000"/>
+                  </a:schemeClr>
+                </a:solidFill>
+              </a:rPr>
+              <a:t>           Oldřichova 49, Praha 2</a:t>
+            </a:r>
+          </a:p>
+          <a:p>
+            <a:r>
+              <a:rPr lang="cs-CZ" sz="1100" dirty="0" smtClean="0">
+                <a:solidFill>
+                  <a:schemeClr val="tx1">
+                    <a:lumMod val="50000"/>
+                    <a:lumOff val="50000"/>
+                  </a:schemeClr>
+                </a:solidFill>
+              </a:rPr>
+              <a:t>           Tram Svatoplukova</a:t>
+            </a:r>
+          </a:p>
+          <a:p>
+            <a:r>
+              <a:rPr lang="cs-CZ" sz="1100" dirty="0" smtClean="0">
+                <a:solidFill>
+                  <a:schemeClr val="tx1">
+                    <a:lumMod val="50000"/>
+                    <a:lumOff val="50000"/>
+                  </a:schemeClr>
+                </a:solidFill>
+              </a:rPr>
+              <a:t>           50°04’N, 14°25’E</a:t>
+            </a:r>
+          </a:p>
+          <a:p>
+            <a:r>
               <a:rPr lang="cs-CZ" sz="1100" b="1" dirty="0" smtClean="0">
                 <a:solidFill>
                   <a:schemeClr val="tx1">
@@ -3377,7 +3441,7 @@
                   </a:schemeClr>
                 </a:solidFill>
               </a:rPr>
-              <a:t>Kde: </a:t>
+              <a:t>Cena:</a:t>
             </a:r>
             <a:r>
               <a:rPr lang="cs-CZ" sz="1100" dirty="0" smtClean="0">
@@ -3388,8 +3452,43 @@
                   </a:schemeClr>
                 </a:solidFill>
               </a:rPr>
-              <a:t>  </a:t>
-            </a:r>
+              <a:t>  1000,- Kč student </a:t>
+            </a:r>
+            <a:r>
+              <a:rPr lang="cs-CZ" sz="900" dirty="0" smtClean="0">
+                <a:solidFill>
+                  <a:schemeClr val="tx1">
+                    <a:lumMod val="50000"/>
+                    <a:lumOff val="50000"/>
+                  </a:schemeClr>
+                </a:solidFill>
+              </a:rPr>
+              <a:t>při </a:t>
+            </a:r>
+            <a:r>
+              <a:rPr lang="en-US" sz="900" dirty="0" smtClean="0">
+                <a:solidFill>
+                  <a:schemeClr val="tx1">
+                    <a:lumMod val="50000"/>
+                    <a:lumOff val="50000"/>
+                  </a:schemeClr>
+                </a:solidFill>
+              </a:rPr>
+              <a:t>v</a:t>
+            </a:r>
+            <a:r>
+              <a:rPr lang="cs-CZ" sz="900" dirty="0" smtClean="0">
+                <a:solidFill>
+                  <a:schemeClr val="tx1">
+                    <a:lumMod val="50000"/>
+                    <a:lumOff val="50000"/>
+                  </a:schemeClr>
+                </a:solidFill>
+              </a:rPr>
+              <a:t>časné registraci maximálně 5 míst </a:t>
+            </a:r>
+          </a:p>
+          <a:p>
             <a:r>
               <a:rPr lang="cs-CZ" sz="1100" dirty="0" smtClean="0">
                 <a:solidFill>
@@ -3398,179 +3497,9 @@
                     <a:lumOff val="50000"/>
                   </a:schemeClr>
                 </a:solidFill>
-                <a:hlinkClick r:id="rId3"/>
-              </a:rPr>
-              <a:t>www.edu2000.cz</a:t>
-            </a:r>
-            <a:endParaRPr lang="cs-CZ" sz="1100" dirty="0" smtClean="0">
-              <a:solidFill>
-                <a:schemeClr val="tx1">
-                  <a:lumMod val="50000"/>
-                  <a:lumOff val="50000"/>
-                </a:schemeClr>
-              </a:solidFill>
-            </a:endParaRPr>
-          </a:p>
-          <a:p>
-            <a:r>
-              <a:rPr lang="cs-CZ" sz="1100" dirty="0" smtClean="0">
-                <a:solidFill>
-                  <a:schemeClr val="tx1">
-                    <a:lumMod val="50000"/>
-                    <a:lumOff val="50000"/>
-                  </a:schemeClr>
-                </a:solidFill>
-              </a:rPr>
-              <a:t>           Oldřichova 49, Praha 2</a:t>
-            </a:r>
-          </a:p>
-          <a:p>
-            <a:r>
-              <a:rPr lang="cs-CZ" sz="1100" dirty="0" smtClean="0">
-                <a:solidFill>
-                  <a:schemeClr val="tx1">
-                    <a:lumMod val="50000"/>
-                    <a:lumOff val="50000"/>
-                  </a:schemeClr>
-                </a:solidFill>
-              </a:rPr>
-              <a:t>           Tram Svatoplukova</a:t>
-            </a:r>
-          </a:p>
-          <a:p>
-            <a:r>
-              <a:rPr lang="cs-CZ" sz="1100" dirty="0" smtClean="0">
-                <a:solidFill>
-                  <a:schemeClr val="tx1">
-                    <a:lumMod val="50000"/>
-                    <a:lumOff val="50000"/>
-                  </a:schemeClr>
-                </a:solidFill>
-              </a:rPr>
-              <a:t>           50°04’N, </a:t>
-            </a:r>
-            <a:r>
-              <a:rPr lang="cs-CZ" sz="1100" dirty="0" smtClean="0">
-                <a:solidFill>
-                  <a:schemeClr val="tx1">
-                    <a:lumMod val="50000"/>
-                    <a:lumOff val="50000"/>
-                  </a:schemeClr>
-                </a:solidFill>
-              </a:rPr>
-              <a:t>14°25’E</a:t>
-            </a:r>
-          </a:p>
-          <a:p>
-            <a:r>
-              <a:rPr lang="cs-CZ" sz="1100" b="1" dirty="0" smtClean="0">
-                <a:solidFill>
-                  <a:schemeClr val="tx1">
-                    <a:lumMod val="50000"/>
-                    <a:lumOff val="50000"/>
-                  </a:schemeClr>
-                </a:solidFill>
-              </a:rPr>
-              <a:t>Cena</a:t>
-            </a:r>
-            <a:r>
-              <a:rPr lang="cs-CZ" sz="1100" b="1" dirty="0" smtClean="0">
-                <a:solidFill>
-                  <a:schemeClr val="tx1">
-                    <a:lumMod val="50000"/>
-                    <a:lumOff val="50000"/>
-                  </a:schemeClr>
-                </a:solidFill>
-              </a:rPr>
-              <a:t>:</a:t>
-            </a:r>
-            <a:r>
-              <a:rPr lang="cs-CZ" sz="1100" dirty="0" smtClean="0">
-                <a:solidFill>
-                  <a:schemeClr val="tx1">
-                    <a:lumMod val="50000"/>
-                    <a:lumOff val="50000"/>
-                  </a:schemeClr>
-                </a:solidFill>
-              </a:rPr>
-              <a:t>  1000,- Kč student </a:t>
-            </a:r>
-            <a:r>
-              <a:rPr lang="cs-CZ" sz="900" dirty="0" smtClean="0">
-                <a:solidFill>
-                  <a:schemeClr val="tx1">
-                    <a:lumMod val="50000"/>
-                    <a:lumOff val="50000"/>
-                  </a:schemeClr>
-                </a:solidFill>
-              </a:rPr>
-              <a:t>při </a:t>
-            </a:r>
-            <a:r>
-              <a:rPr lang="en-US" sz="900" dirty="0" smtClean="0">
-                <a:solidFill>
-                  <a:schemeClr val="tx1">
-                    <a:lumMod val="50000"/>
-                    <a:lumOff val="50000"/>
-                  </a:schemeClr>
-                </a:solidFill>
-              </a:rPr>
-              <a:t>v</a:t>
-            </a:r>
-            <a:r>
-              <a:rPr lang="cs-CZ" sz="900" dirty="0" smtClean="0">
-                <a:solidFill>
-                  <a:schemeClr val="tx1">
-                    <a:lumMod val="50000"/>
-                    <a:lumOff val="50000"/>
-                  </a:schemeClr>
-                </a:solidFill>
-              </a:rPr>
-              <a:t>časné registraci </a:t>
-            </a:r>
-            <a:r>
-              <a:rPr lang="cs-CZ" sz="900" dirty="0" smtClean="0">
-                <a:solidFill>
-                  <a:schemeClr val="tx1">
-                    <a:lumMod val="50000"/>
-                    <a:lumOff val="50000"/>
-                  </a:schemeClr>
-                </a:solidFill>
-              </a:rPr>
-              <a:t>maximálně 5 míst </a:t>
-            </a:r>
-          </a:p>
-          <a:p>
-            <a:r>
-              <a:rPr lang="cs-CZ" sz="1100" dirty="0" smtClean="0">
-                <a:solidFill>
-                  <a:schemeClr val="tx1">
-                    <a:lumMod val="50000"/>
-                    <a:lumOff val="50000"/>
-                  </a:schemeClr>
-                </a:solidFill>
-              </a:rPr>
-              <a:t>            6000,- Kč včasná </a:t>
-            </a:r>
-            <a:r>
-              <a:rPr lang="cs-CZ" sz="1100" dirty="0" smtClean="0">
-                <a:solidFill>
-                  <a:schemeClr val="tx1">
-                    <a:lumMod val="50000"/>
-                    <a:lumOff val="50000"/>
-                  </a:schemeClr>
-                </a:solidFill>
-              </a:rPr>
-              <a:t>registrace</a:t>
-            </a:r>
-            <a:endParaRPr lang="cs-CZ" sz="1100" dirty="0" smtClean="0">
-              <a:solidFill>
-                <a:schemeClr val="tx1">
-                  <a:lumMod val="50000"/>
-                  <a:lumOff val="50000"/>
-                </a:schemeClr>
-              </a:solidFill>
-            </a:endParaRPr>
+              </a:rPr>
+              <a:t>            6000,- Kč včasná registrace</a:t>
+            </a:r>
           </a:p>
           <a:p>
             <a:r>

</xml_diff>